<commit_message>
complete code and tutorial
</commit_message>
<xml_diff>
--- a/tutorial/Vanishing_gradients.pptx
+++ b/tutorial/Vanishing_gradients.pptx
@@ -131,15 +131,6 @@
 </p:presentation>
 </file>
 
-<file path=ppt/revisionInfo.xml><?xml version="1.0" encoding="utf-8"?>
-<p1510:revInfo xmlns:a="http://schemas.openxmlformats.org/drawingml/2006/main" xmlns:r="http://schemas.openxmlformats.org/officeDocument/2006/relationships" xmlns:p1510="http://schemas.microsoft.com/office/powerpoint/2015/10/main">
-  <p1510:revLst>
-    <p1510:client id="{DFA78AF0-F671-8051-A6F5-304E739DF2B0}" v="264" dt="2024-11-29T15:35:18.459"/>
-    <p1510:client id="{FA36BA85-B8D3-7F7C-6508-7C2FFC101B71}" v="37" dt="2024-11-29T15:49:34.907"/>
-  </p1510:revLst>
-</p1510:revInfo>
-</file>
-
 <file path=ppt/slideLayouts/slideLayout1.xml><?xml version="1.0" encoding="utf-8"?>
 <p:sldLayout xmlns:a="http://schemas.openxmlformats.org/drawingml/2006/main" xmlns:r="http://schemas.openxmlformats.org/officeDocument/2006/relationships" xmlns:p="http://schemas.openxmlformats.org/presentationml/2006/main" type="title" preserve="1">
   <p:cSld name="Title Slide">
@@ -453,7 +444,7 @@
           <a:p>
             <a:fld id="{1E351CED-465B-40B5-ADCE-957C918F227B}" type="datetimeFigureOut">
               <a:rPr lang="en-US" smtClean="0"/>
-              <a:t>12/1/2024</a:t>
+              <a:t>12/3/2024</a:t>
             </a:fld>
             <a:endParaRPr lang="en-US"/>
           </a:p>
@@ -661,7 +652,7 @@
           <a:p>
             <a:fld id="{1E351CED-465B-40B5-ADCE-957C918F227B}" type="datetimeFigureOut">
               <a:rPr lang="en-US" smtClean="0"/>
-              <a:t>12/1/2024</a:t>
+              <a:t>12/3/2024</a:t>
             </a:fld>
             <a:endParaRPr lang="en-US"/>
           </a:p>
@@ -871,7 +862,7 @@
           <a:p>
             <a:fld id="{1E351CED-465B-40B5-ADCE-957C918F227B}" type="datetimeFigureOut">
               <a:rPr lang="en-US" smtClean="0"/>
-              <a:t>12/1/2024</a:t>
+              <a:t>12/3/2024</a:t>
             </a:fld>
             <a:endParaRPr lang="en-US"/>
           </a:p>
@@ -1071,7 +1062,7 @@
           <a:p>
             <a:fld id="{1E351CED-465B-40B5-ADCE-957C918F227B}" type="datetimeFigureOut">
               <a:rPr lang="en-US" smtClean="0"/>
-              <a:t>12/1/2024</a:t>
+              <a:t>12/3/2024</a:t>
             </a:fld>
             <a:endParaRPr lang="en-US"/>
           </a:p>
@@ -1649,7 +1640,7 @@
           <a:p>
             <a:fld id="{1E351CED-465B-40B5-ADCE-957C918F227B}" type="datetimeFigureOut">
               <a:rPr lang="en-US" smtClean="0"/>
-              <a:t>12/1/2024</a:t>
+              <a:t>12/3/2024</a:t>
             </a:fld>
             <a:endParaRPr lang="en-US"/>
           </a:p>
@@ -1922,7 +1913,7 @@
           <a:p>
             <a:fld id="{1E351CED-465B-40B5-ADCE-957C918F227B}" type="datetimeFigureOut">
               <a:rPr lang="en-US" smtClean="0"/>
-              <a:t>12/1/2024</a:t>
+              <a:t>12/3/2024</a:t>
             </a:fld>
             <a:endParaRPr lang="en-US"/>
           </a:p>
@@ -2339,7 +2330,7 @@
           <a:p>
             <a:fld id="{1E351CED-465B-40B5-ADCE-957C918F227B}" type="datetimeFigureOut">
               <a:rPr lang="en-US" smtClean="0"/>
-              <a:t>12/1/2024</a:t>
+              <a:t>12/3/2024</a:t>
             </a:fld>
             <a:endParaRPr lang="en-US"/>
           </a:p>
@@ -2486,7 +2477,7 @@
           <a:p>
             <a:fld id="{1E351CED-465B-40B5-ADCE-957C918F227B}" type="datetimeFigureOut">
               <a:rPr lang="en-US" smtClean="0"/>
-              <a:t>12/1/2024</a:t>
+              <a:t>12/3/2024</a:t>
             </a:fld>
             <a:endParaRPr lang="en-US"/>
           </a:p>
@@ -2599,7 +2590,7 @@
           <a:p>
             <a:fld id="{1E351CED-465B-40B5-ADCE-957C918F227B}" type="datetimeFigureOut">
               <a:rPr lang="en-US" smtClean="0"/>
-              <a:t>12/1/2024</a:t>
+              <a:t>12/3/2024</a:t>
             </a:fld>
             <a:endParaRPr lang="en-US"/>
           </a:p>
@@ -2914,7 +2905,7 @@
           <a:p>
             <a:fld id="{1E351CED-465B-40B5-ADCE-957C918F227B}" type="datetimeFigureOut">
               <a:rPr lang="en-US" smtClean="0"/>
-              <a:t>12/1/2024</a:t>
+              <a:t>12/3/2024</a:t>
             </a:fld>
             <a:endParaRPr lang="en-US"/>
           </a:p>
@@ -3208,7 +3199,7 @@
           <a:p>
             <a:fld id="{1E351CED-465B-40B5-ADCE-957C918F227B}" type="datetimeFigureOut">
               <a:rPr lang="en-US" smtClean="0"/>
-              <a:t>12/1/2024</a:t>
+              <a:t>12/3/2024</a:t>
             </a:fld>
             <a:endParaRPr lang="en-US"/>
           </a:p>
@@ -3449,7 +3440,7 @@
           <a:p>
             <a:fld id="{1E351CED-465B-40B5-ADCE-957C918F227B}" type="datetimeFigureOut">
               <a:rPr lang="en-US" smtClean="0"/>
-              <a:t>12/1/2024</a:t>
+              <a:t>12/3/2024</a:t>
             </a:fld>
             <a:endParaRPr lang="en-US"/>
           </a:p>

</xml_diff>